<commit_message>
modify recitation 1 slides
</commit_message>
<xml_diff>
--- a/rec-notes/r01.pptx
+++ b/rec-notes/r01.pptx
@@ -6647,40 +6647,69 @@
           <a:p>
             <a:r>
               <a:rPr lang="en-US" dirty="0"/>
-              <a:t>Here is a link contains useful command, for both beginners and experienced users:</a:t>
+              <a:t>Here are some useful links:</a:t>
             </a:r>
           </a:p>
           <a:p>
             <a:pPr lvl="1"/>
             <a:r>
+              <a:rPr lang="en-US" dirty="0"/>
+              <a:t>A one-pager: https://</a:t>
+            </a:r>
+            <a:r>
+              <a:rPr lang="en-US" dirty="0" err="1"/>
+              <a:t>nyu-cso.github.io</a:t>
+            </a:r>
+            <a:r>
+              <a:rPr lang="en-US" dirty="0"/>
+              <a:t>/labs/</a:t>
+            </a:r>
+            <a:r>
+              <a:rPr lang="en-US" dirty="0" err="1"/>
+              <a:t>linux_cheat_sheet</a:t>
+            </a:r>
+            <a:endParaRPr lang="en-US" dirty="0"/>
+          </a:p>
+          <a:p>
+            <a:pPr lvl="1"/>
+            <a:r>
               <a:rPr lang="en-US" dirty="0">
-                <a:hlinkClick r:id="rId3"/>
+                <a:hlinkClick r:id="rId3">
+                  <a:extLst>
+                    <a:ext uri="{A12FA001-AC4F-418D-AE19-62706E023703}">
+                      <ahyp:hlinkClr xmlns:ahyp="http://schemas.microsoft.com/office/drawing/2018/hyperlinkcolor" val="tx"/>
+                    </a:ext>
+                  </a:extLst>
+                </a:hlinkClick>
               </a:rPr>
-              <a:t>https://</a:t>
-            </a:r>
-            <a:r>
-              <a:rPr lang="en-US" dirty="0" err="1">
-                <a:hlinkClick r:id="rId3"/>
+              <a:t>A more descriptive source</a:t>
+            </a:r>
+            <a:r>
+              <a:rPr lang="en-US" dirty="0">
+                <a:solidFill>
+                  <a:srgbClr val="0563C1"/>
+                </a:solidFill>
+                <a:hlinkClick r:id="rId3">
+                  <a:extLst>
+                    <a:ext uri="{A12FA001-AC4F-418D-AE19-62706E023703}">
+                      <ahyp:hlinkClr xmlns:ahyp="http://schemas.microsoft.com/office/drawing/2018/hyperlinkcolor" val="tx"/>
+                    </a:ext>
+                  </a:extLst>
+                </a:hlinkClick>
               </a:rPr>
-              <a:t>github.com</a:t>
+              <a:t>: https://</a:t>
             </a:r>
             <a:r>
               <a:rPr lang="en-US" dirty="0">
-                <a:hlinkClick r:id="rId3"/>
+                <a:hlinkClick r:id="rId3">
+                  <a:extLst>
+                    <a:ext uri="{A12FA001-AC4F-418D-AE19-62706E023703}">
+                      <ahyp:hlinkClr xmlns:ahyp="http://schemas.microsoft.com/office/drawing/2018/hyperlinkcolor" val="tx"/>
+                    </a:ext>
+                  </a:extLst>
+                </a:hlinkClick>
               </a:rPr>
-              <a:t>/</a:t>
-            </a:r>
-            <a:r>
-              <a:rPr lang="en-US" dirty="0" err="1">
-                <a:hlinkClick r:id="rId3"/>
-              </a:rPr>
-              <a:t>jlevy</a:t>
-            </a:r>
-            <a:r>
-              <a:rPr lang="en-US" dirty="0">
-                <a:hlinkClick r:id="rId3"/>
-              </a:rPr>
-              <a:t>/the-art-of-command-line</a:t>
+              <a:t>github.com/jlevy/the-art-of-command-line</a:t>
             </a:r>
             <a:endParaRPr lang="en-US" dirty="0"/>
           </a:p>
@@ -6772,7 +6801,12 @@
             <p:ph idx="1"/>
           </p:nvPr>
         </p:nvSpPr>
-        <p:spPr/>
+        <p:spPr>
+          <a:xfrm>
+            <a:off x="838200" y="1825625"/>
+            <a:ext cx="10988040" cy="4351338"/>
+          </a:xfrm>
+        </p:spPr>
         <p:txBody>
           <a:bodyPr/>
           <a:lstStyle/>
@@ -6825,14 +6859,29 @@
           <a:p>
             <a:r>
               <a:rPr lang="en-US" dirty="0"/>
-              <a:t>We recommend you use Sublime Text</a:t>
+              <a:t>We recommend you use nano</a:t>
             </a:r>
           </a:p>
           <a:p>
             <a:pPr lvl="1"/>
             <a:r>
               <a:rPr lang="en-US" dirty="0"/>
-              <a:t>Which should be already installed on the VM image</a:t>
+              <a:t>Unfortunately, </a:t>
+            </a:r>
+            <a:r>
+              <a:rPr lang="en-US" dirty="0" err="1"/>
+              <a:t>vscode</a:t>
+            </a:r>
+            <a:r>
+              <a:rPr lang="en-US" dirty="0"/>
+              <a:t> and sublime are not installed on snappy1</a:t>
+            </a:r>
+          </a:p>
+          <a:p>
+            <a:pPr lvl="1"/>
+            <a:r>
+              <a:rPr lang="en-US" dirty="0"/>
+              <a:t>No self-respecting programmers use nano, but you can get by with nano in CSO </a:t>
             </a:r>
           </a:p>
         </p:txBody>
@@ -6957,30 +7006,20 @@
             <a:pPr lvl="1"/>
             <a:r>
               <a:rPr lang="en-US" dirty="0"/>
-              <a:t>Create your lab-1 repository by clicking the link below</a:t>
-            </a:r>
+              <a:t>Create your lab-1 repository by following the link posted on </a:t>
+            </a:r>
+            <a:r>
+              <a:rPr lang="en-US" dirty="0" err="1"/>
+              <a:t>Campuswire</a:t>
+            </a:r>
+            <a:endParaRPr lang="en-US" dirty="0"/>
           </a:p>
           <a:p>
             <a:pPr lvl="2"/>
             <a:r>
-              <a:rPr lang="en-US" u="sng" dirty="0">
-                <a:hlinkClick r:id="rId3"/>
-              </a:rPr>
-              <a:t>https://classroom.github.com/a/RvmnAdGI</a:t>
-            </a:r>
-            <a:endParaRPr lang="en-US" dirty="0"/>
-          </a:p>
-          <a:p>
-            <a:pPr lvl="2"/>
-            <a:r>
-              <a:rPr lang="en-US" dirty="0"/>
-              <a:t>Select your NYU </a:t>
-            </a:r>
-            <a:r>
-              <a:rPr lang="en-US" dirty="0" err="1"/>
-              <a:t>NetID</a:t>
-            </a:r>
-            <a:endParaRPr lang="en-US" dirty="0"/>
+              <a:rPr lang="en-US" dirty="0"/>
+              <a:t>Select your NYU NetID</a:t>
+            </a:r>
           </a:p>
           <a:p>
             <a:pPr lvl="3"/>
@@ -7251,26 +7290,39 @@
                                   </p:childTnLst>
                                 </p:cTn>
                               </p:par>
-                            </p:childTnLst>
-                          </p:cTn>
-                        </p:par>
-                      </p:childTnLst>
-                    </p:cTn>
-                  </p:par>
-                  <p:par>
-                    <p:cTn id="19" fill="hold">
-                      <p:stCondLst>
-                        <p:cond delay="indefinite"/>
-                      </p:stCondLst>
-                      <p:childTnLst>
-                        <p:par>
-                          <p:cTn id="20" fill="hold">
-                            <p:stCondLst>
-                              <p:cond delay="0"/>
-                            </p:stCondLst>
-                            <p:childTnLst>
                               <p:par>
-                                <p:cTn id="21" presetID="1" presetClass="entr" presetSubtype="0" fill="hold" nodeType="clickEffect">
+                                <p:cTn id="19" presetID="1" presetClass="entr" presetSubtype="0" fill="hold" nodeType="withEffect">
+                                  <p:stCondLst>
+                                    <p:cond delay="0"/>
+                                  </p:stCondLst>
+                                  <p:childTnLst>
+                                    <p:set>
+                                      <p:cBhvr>
+                                        <p:cTn id="20" dur="1" fill="hold">
+                                          <p:stCondLst>
+                                            <p:cond delay="0"/>
+                                          </p:stCondLst>
+                                        </p:cTn>
+                                        <p:tgtEl>
+                                          <p:spTgt spid="3">
+                                            <p:txEl>
+                                              <p:pRg st="4" end="4"/>
+                                            </p:txEl>
+                                          </p:spTgt>
+                                        </p:tgtEl>
+                                        <p:attrNameLst>
+                                          <p:attrName>style.visibility</p:attrName>
+                                        </p:attrNameLst>
+                                      </p:cBhvr>
+                                      <p:to>
+                                        <p:strVal val="visible"/>
+                                      </p:to>
+                                    </p:set>
+                                  </p:childTnLst>
+                                </p:cTn>
+                              </p:par>
+                              <p:par>
+                                <p:cTn id="21" presetID="1" presetClass="entr" presetSubtype="0" fill="hold" nodeType="withEffect">
                                   <p:stCondLst>
                                     <p:cond delay="0"/>
                                   </p:stCondLst>
@@ -7285,7 +7337,7 @@
                                         <p:tgtEl>
                                           <p:spTgt spid="3">
                                             <p:txEl>
-                                              <p:pRg st="4" end="4"/>
+                                              <p:pRg st="5" end="5"/>
                                             </p:txEl>
                                           </p:spTgt>
                                         </p:tgtEl>
@@ -7316,69 +7368,7 @@
                                         <p:tgtEl>
                                           <p:spTgt spid="3">
                                             <p:txEl>
-                                              <p:pRg st="5" end="5"/>
-                                            </p:txEl>
-                                          </p:spTgt>
-                                        </p:tgtEl>
-                                        <p:attrNameLst>
-                                          <p:attrName>style.visibility</p:attrName>
-                                        </p:attrNameLst>
-                                      </p:cBhvr>
-                                      <p:to>
-                                        <p:strVal val="visible"/>
-                                      </p:to>
-                                    </p:set>
-                                  </p:childTnLst>
-                                </p:cTn>
-                              </p:par>
-                              <p:par>
-                                <p:cTn id="25" presetID="1" presetClass="entr" presetSubtype="0" fill="hold" nodeType="withEffect">
-                                  <p:stCondLst>
-                                    <p:cond delay="0"/>
-                                  </p:stCondLst>
-                                  <p:childTnLst>
-                                    <p:set>
-                                      <p:cBhvr>
-                                        <p:cTn id="26" dur="1" fill="hold">
-                                          <p:stCondLst>
-                                            <p:cond delay="0"/>
-                                          </p:stCondLst>
-                                        </p:cTn>
-                                        <p:tgtEl>
-                                          <p:spTgt spid="3">
-                                            <p:txEl>
                                               <p:pRg st="6" end="6"/>
-                                            </p:txEl>
-                                          </p:spTgt>
-                                        </p:tgtEl>
-                                        <p:attrNameLst>
-                                          <p:attrName>style.visibility</p:attrName>
-                                        </p:attrNameLst>
-                                      </p:cBhvr>
-                                      <p:to>
-                                        <p:strVal val="visible"/>
-                                      </p:to>
-                                    </p:set>
-                                  </p:childTnLst>
-                                </p:cTn>
-                              </p:par>
-                              <p:par>
-                                <p:cTn id="27" presetID="1" presetClass="entr" presetSubtype="0" fill="hold" nodeType="withEffect">
-                                  <p:stCondLst>
-                                    <p:cond delay="0"/>
-                                  </p:stCondLst>
-                                  <p:childTnLst>
-                                    <p:set>
-                                      <p:cBhvr>
-                                        <p:cTn id="28" dur="1" fill="hold">
-                                          <p:stCondLst>
-                                            <p:cond delay="0"/>
-                                          </p:stCondLst>
-                                        </p:cTn>
-                                        <p:tgtEl>
-                                          <p:spTgt spid="3">
-                                            <p:txEl>
-                                              <p:pRg st="7" end="7"/>
                                             </p:txEl>
                                           </p:spTgt>
                                         </p:tgtEl>
@@ -7400,26 +7390,26 @@
                     </p:cTn>
                   </p:par>
                   <p:par>
-                    <p:cTn id="29" fill="hold">
+                    <p:cTn id="25" fill="hold">
                       <p:stCondLst>
                         <p:cond delay="indefinite"/>
                       </p:stCondLst>
                       <p:childTnLst>
                         <p:par>
-                          <p:cTn id="30" fill="hold">
+                          <p:cTn id="26" fill="hold">
                             <p:stCondLst>
                               <p:cond delay="0"/>
                             </p:stCondLst>
                             <p:childTnLst>
                               <p:par>
-                                <p:cTn id="31" presetID="1" presetClass="entr" presetSubtype="0" fill="hold" nodeType="clickEffect">
+                                <p:cTn id="27" presetID="1" presetClass="entr" presetSubtype="0" fill="hold" nodeType="clickEffect">
                                   <p:stCondLst>
                                     <p:cond delay="0"/>
                                   </p:stCondLst>
                                   <p:childTnLst>
                                     <p:set>
                                       <p:cBhvr>
-                                        <p:cTn id="32" dur="1" fill="hold">
+                                        <p:cTn id="28" dur="1" fill="hold">
                                           <p:stCondLst>
                                             <p:cond delay="0"/>
                                           </p:stCondLst>
@@ -7427,7 +7417,7 @@
                                         <p:tgtEl>
                                           <p:spTgt spid="3">
                                             <p:txEl>
-                                              <p:pRg st="8" end="8"/>
+                                              <p:pRg st="7" end="7"/>
                                             </p:txEl>
                                           </p:spTgt>
                                         </p:tgtEl>
@@ -10060,20 +10050,12 @@
           <a:p>
             <a:pPr lvl="1"/>
             <a:r>
-              <a:rPr lang="en-US" dirty="0" err="1">
-                <a:solidFill>
-                  <a:schemeClr val="accent1"/>
-                </a:solidFill>
-              </a:rPr>
-              <a:t>git</a:t>
-            </a:r>
-            <a:r>
               <a:rPr lang="en-US" dirty="0">
                 <a:solidFill>
                   <a:schemeClr val="accent1"/>
                 </a:solidFill>
               </a:rPr>
-              <a:t> clone https://</a:t>
+              <a:t>git clone https://</a:t>
             </a:r>
             <a:r>
               <a:rPr lang="en-US" dirty="0" err="1">
@@ -10089,7 +10071,7 @@
                   <a:schemeClr val="accent1"/>
                 </a:solidFill>
               </a:rPr>
-              <a:t>/nyu-cso-fa20/clab-part1-&lt;</a:t>
+              <a:t>/nyu-cso-fa21/clab-part1-&lt;</a:t>
             </a:r>
             <a:r>
               <a:rPr lang="en-US" dirty="0" err="1">
@@ -10105,23 +10087,7 @@
                   <a:schemeClr val="accent1"/>
                 </a:solidFill>
               </a:rPr>
-              <a:t>&gt;.</a:t>
-            </a:r>
-            <a:r>
-              <a:rPr lang="en-US" dirty="0" err="1">
-                <a:solidFill>
-                  <a:schemeClr val="accent1"/>
-                </a:solidFill>
-              </a:rPr>
-              <a:t>git</a:t>
-            </a:r>
-            <a:r>
-              <a:rPr lang="en-US" dirty="0">
-                <a:solidFill>
-                  <a:schemeClr val="accent1"/>
-                </a:solidFill>
-              </a:rPr>
-              <a:t> lab1</a:t>
+              <a:t>&gt;.git lab1</a:t>
             </a:r>
           </a:p>
           <a:p>
@@ -10401,6 +10367,112 @@
           </a:p>
         </p:txBody>
       </p:sp>
+      <p:cxnSp>
+        <p:nvCxnSpPr>
+          <p:cNvPr id="6" name="Straight Connector 5">
+            <a:extLst>
+              <a:ext uri="{FF2B5EF4-FFF2-40B4-BE49-F238E27FC236}">
+                <a16:creationId xmlns:a16="http://schemas.microsoft.com/office/drawing/2014/main" id="{53AC4F74-9233-9743-BDD8-3A41C4AE750F}"/>
+              </a:ext>
+            </a:extLst>
+          </p:cNvPr>
+          <p:cNvCxnSpPr/>
+          <p:nvPr/>
+        </p:nvCxnSpPr>
+        <p:spPr>
+          <a:xfrm flipV="1">
+            <a:off x="8610600" y="5288280"/>
+            <a:ext cx="914400" cy="369570"/>
+          </a:xfrm>
+          <a:prstGeom prst="line">
+            <a:avLst/>
+          </a:prstGeom>
+        </p:spPr>
+        <p:style>
+          <a:lnRef idx="2">
+            <a:schemeClr val="accent4"/>
+          </a:lnRef>
+          <a:fillRef idx="0">
+            <a:schemeClr val="accent4"/>
+          </a:fillRef>
+          <a:effectRef idx="1">
+            <a:schemeClr val="accent4"/>
+          </a:effectRef>
+          <a:fontRef idx="minor">
+            <a:schemeClr val="tx1"/>
+          </a:fontRef>
+        </p:style>
+      </p:cxnSp>
+      <p:sp>
+        <p:nvSpPr>
+          <p:cNvPr id="7" name="TextBox 6">
+            <a:extLst>
+              <a:ext uri="{FF2B5EF4-FFF2-40B4-BE49-F238E27FC236}">
+                <a16:creationId xmlns:a16="http://schemas.microsoft.com/office/drawing/2014/main" id="{04B8B521-DD46-A243-A7F3-F919D01FF8C4}"/>
+              </a:ext>
+            </a:extLst>
+          </p:cNvPr>
+          <p:cNvSpPr txBox="1"/>
+          <p:nvPr/>
+        </p:nvSpPr>
+        <p:spPr>
+          <a:xfrm>
+            <a:off x="8728883" y="5641142"/>
+            <a:ext cx="986617" cy="369332"/>
+          </a:xfrm>
+          <a:prstGeom prst="rect">
+            <a:avLst/>
+          </a:prstGeom>
+          <a:noFill/>
+        </p:spPr>
+        <p:txBody>
+          <a:bodyPr wrap="none" rtlCol="0">
+            <a:spAutoFit/>
+          </a:bodyPr>
+          <a:lstStyle/>
+          <a:p>
+            <a:r>
+              <a:rPr lang="en-US" dirty="0"/>
+              <a:t>Snappy1</a:t>
+            </a:r>
+          </a:p>
+        </p:txBody>
+      </p:sp>
+      <p:sp>
+        <p:nvSpPr>
+          <p:cNvPr id="10" name="TextBox 9">
+            <a:extLst>
+              <a:ext uri="{FF2B5EF4-FFF2-40B4-BE49-F238E27FC236}">
+                <a16:creationId xmlns:a16="http://schemas.microsoft.com/office/drawing/2014/main" id="{451A14DE-84C7-F94A-B8E6-32092907B459}"/>
+              </a:ext>
+            </a:extLst>
+          </p:cNvPr>
+          <p:cNvSpPr txBox="1"/>
+          <p:nvPr/>
+        </p:nvSpPr>
+        <p:spPr>
+          <a:xfrm>
+            <a:off x="3106969" y="5641142"/>
+            <a:ext cx="1918154" cy="369332"/>
+          </a:xfrm>
+          <a:prstGeom prst="rect">
+            <a:avLst/>
+          </a:prstGeom>
+          <a:noFill/>
+        </p:spPr>
+        <p:txBody>
+          <a:bodyPr wrap="none" rtlCol="0">
+            <a:spAutoFit/>
+          </a:bodyPr>
+          <a:lstStyle/>
+          <a:p>
+            <a:r>
+              <a:rPr lang="en-US" dirty="0"/>
+              <a:t>stored on snappy1</a:t>
+            </a:r>
+          </a:p>
+        </p:txBody>
+      </p:sp>
     </p:spTree>
     <p:extLst>
       <p:ext uri="{BB962C8B-B14F-4D97-AF65-F5344CB8AC3E}">
@@ -10441,14 +10513,19 @@
             <p:ph type="title"/>
           </p:nvPr>
         </p:nvSpPr>
-        <p:spPr/>
-        <p:txBody>
-          <a:bodyPr/>
-          <a:lstStyle/>
-          <a:p>
-            <a:r>
-              <a:rPr lang="en-US" dirty="0"/>
-              <a:t>A closer look at your local repository</a:t>
+        <p:spPr>
+          <a:xfrm>
+            <a:off x="274320" y="307419"/>
+            <a:ext cx="11917680" cy="1325563"/>
+          </a:xfrm>
+        </p:spPr>
+        <p:txBody>
+          <a:bodyPr/>
+          <a:lstStyle/>
+          <a:p>
+            <a:r>
+              <a:rPr lang="en-US" dirty="0"/>
+              <a:t>A closer look at your repository stored on snappy1</a:t>
             </a:r>
           </a:p>
         </p:txBody>
@@ -10491,7 +10568,7 @@
         <p:spPr>
           <a:xfrm>
             <a:off x="3714750" y="6149340"/>
-            <a:ext cx="3246120" cy="369332"/>
+            <a:ext cx="4499610" cy="369332"/>
           </a:xfrm>
           <a:prstGeom prst="rect">
             <a:avLst/>
@@ -10506,7 +10583,7 @@
           <a:p>
             <a:r>
               <a:rPr lang="en-US" dirty="0"/>
-              <a:t>Local repository</a:t>
+              <a:t>Local repository stored on snappy1</a:t>
             </a:r>
           </a:p>
         </p:txBody>
@@ -10703,8 +10780,8 @@
         </p:blipFill>
         <p:spPr>
           <a:xfrm>
-            <a:off x="8491220" y="2851973"/>
-            <a:ext cx="2393950" cy="3414684"/>
+            <a:off x="7127208" y="2195545"/>
+            <a:ext cx="3058160" cy="4362100"/>
           </a:xfrm>
           <a:prstGeom prst="rect">
             <a:avLst/>
@@ -10733,7 +10810,7 @@
         </p:blipFill>
         <p:spPr>
           <a:xfrm>
-            <a:off x="7995154" y="498832"/>
+            <a:off x="7117080" y="355330"/>
             <a:ext cx="2896366" cy="1671955"/>
           </a:xfrm>
           <a:prstGeom prst="rect">
@@ -10760,6 +10837,163 @@
               <a:rPr lang="en-US" smtClean="0"/>
               <a:t>25</a:t>
             </a:fld>
+            <a:endParaRPr lang="en-US" dirty="0"/>
+          </a:p>
+        </p:txBody>
+      </p:sp>
+      <p:pic>
+        <p:nvPicPr>
+          <p:cNvPr id="4" name="Picture 3">
+            <a:extLst>
+              <a:ext uri="{FF2B5EF4-FFF2-40B4-BE49-F238E27FC236}">
+                <a16:creationId xmlns:a16="http://schemas.microsoft.com/office/drawing/2014/main" id="{5792FC2C-C008-184D-9DB7-F3B0D13364A9}"/>
+              </a:ext>
+            </a:extLst>
+          </p:cNvPr>
+          <p:cNvPicPr>
+            <a:picLocks noChangeAspect="1"/>
+          </p:cNvPicPr>
+          <p:nvPr/>
+        </p:nvPicPr>
+        <p:blipFill>
+          <a:blip r:embed="rId5"/>
+          <a:stretch>
+            <a:fillRect/>
+          </a:stretch>
+        </p:blipFill>
+        <p:spPr>
+          <a:xfrm>
+            <a:off x="10408855" y="4660937"/>
+            <a:ext cx="1422400" cy="1422400"/>
+          </a:xfrm>
+          <a:prstGeom prst="rect">
+            <a:avLst/>
+          </a:prstGeom>
+        </p:spPr>
+      </p:pic>
+      <p:sp>
+        <p:nvSpPr>
+          <p:cNvPr id="7" name="TextBox 6">
+            <a:extLst>
+              <a:ext uri="{FF2B5EF4-FFF2-40B4-BE49-F238E27FC236}">
+                <a16:creationId xmlns:a16="http://schemas.microsoft.com/office/drawing/2014/main" id="{5653E364-FBB2-504D-B973-F1A30D3D1B7D}"/>
+              </a:ext>
+            </a:extLst>
+          </p:cNvPr>
+          <p:cNvSpPr txBox="1"/>
+          <p:nvPr/>
+        </p:nvSpPr>
+        <p:spPr>
+          <a:xfrm>
+            <a:off x="10281422" y="5942568"/>
+            <a:ext cx="1285608" cy="369332"/>
+          </a:xfrm>
+          <a:prstGeom prst="rect">
+            <a:avLst/>
+          </a:prstGeom>
+          <a:noFill/>
+        </p:spPr>
+        <p:txBody>
+          <a:bodyPr wrap="none" rtlCol="0">
+            <a:spAutoFit/>
+          </a:bodyPr>
+          <a:lstStyle/>
+          <a:p>
+            <a:r>
+              <a:rPr lang="en-US" dirty="0" err="1"/>
+              <a:t>Github.com</a:t>
+            </a:r>
+            <a:endParaRPr lang="en-US" dirty="0"/>
+          </a:p>
+        </p:txBody>
+      </p:sp>
+      <p:sp>
+        <p:nvSpPr>
+          <p:cNvPr id="9" name="Freeform 8">
+            <a:extLst>
+              <a:ext uri="{FF2B5EF4-FFF2-40B4-BE49-F238E27FC236}">
+                <a16:creationId xmlns:a16="http://schemas.microsoft.com/office/drawing/2014/main" id="{71D08F00-937F-4642-AFD2-311E6C8D13A3}"/>
+              </a:ext>
+            </a:extLst>
+          </p:cNvPr>
+          <p:cNvSpPr/>
+          <p:nvPr/>
+        </p:nvSpPr>
+        <p:spPr>
+          <a:xfrm>
+            <a:off x="8333907" y="5852075"/>
+            <a:ext cx="2170969" cy="515229"/>
+          </a:xfrm>
+          <a:custGeom>
+            <a:avLst/>
+            <a:gdLst>
+              <a:gd name="connsiteX0" fmla="*/ 0 w 1905000"/>
+              <a:gd name="connsiteY0" fmla="*/ 0 h 515229"/>
+              <a:gd name="connsiteX1" fmla="*/ 777240 w 1905000"/>
+              <a:gd name="connsiteY1" fmla="*/ 487680 h 515229"/>
+              <a:gd name="connsiteX2" fmla="*/ 1905000 w 1905000"/>
+              <a:gd name="connsiteY2" fmla="*/ 411480 h 515229"/>
+            </a:gdLst>
+            <a:ahLst/>
+            <a:cxnLst>
+              <a:cxn ang="0">
+                <a:pos x="connsiteX0" y="connsiteY0"/>
+              </a:cxn>
+              <a:cxn ang="0">
+                <a:pos x="connsiteX1" y="connsiteY1"/>
+              </a:cxn>
+              <a:cxn ang="0">
+                <a:pos x="connsiteX2" y="connsiteY2"/>
+              </a:cxn>
+            </a:cxnLst>
+            <a:rect l="l" t="t" r="r" b="b"/>
+            <a:pathLst>
+              <a:path w="1905000" h="515229">
+                <a:moveTo>
+                  <a:pt x="0" y="0"/>
+                </a:moveTo>
+                <a:cubicBezTo>
+                  <a:pt x="229870" y="209550"/>
+                  <a:pt x="459740" y="419100"/>
+                  <a:pt x="777240" y="487680"/>
+                </a:cubicBezTo>
+                <a:cubicBezTo>
+                  <a:pt x="1094740" y="556260"/>
+                  <a:pt x="1499870" y="483870"/>
+                  <a:pt x="1905000" y="411480"/>
+                </a:cubicBezTo>
+              </a:path>
+            </a:pathLst>
+          </a:custGeom>
+          <a:noFill/>
+          <a:ln w="101600">
+            <a:solidFill>
+              <a:srgbClr val="FFFF00"/>
+            </a:solidFill>
+            <a:tailEnd type="stealth" w="lg" len="lg"/>
+          </a:ln>
+        </p:spPr>
+        <p:style>
+          <a:lnRef idx="2">
+            <a:schemeClr val="accent1">
+              <a:shade val="50000"/>
+            </a:schemeClr>
+          </a:lnRef>
+          <a:fillRef idx="1">
+            <a:schemeClr val="accent1"/>
+          </a:fillRef>
+          <a:effectRef idx="0">
+            <a:schemeClr val="accent1"/>
+          </a:effectRef>
+          <a:fontRef idx="minor">
+            <a:schemeClr val="lt1"/>
+          </a:fontRef>
+        </p:style>
+        <p:txBody>
+          <a:bodyPr rtlCol="0" anchor="ctr"/>
+          <a:lstStyle/>
+          <a:p>
+            <a:pPr algn="ctr"/>
             <a:endParaRPr lang="en-US"/>
           </a:p>
         </p:txBody>
@@ -10913,7 +11147,7 @@
         </p:spPr>
         <p:txBody>
           <a:bodyPr>
-            <a:normAutofit fontScale="92500"/>
+            <a:normAutofit lnSpcReduction="10000"/>
           </a:bodyPr>
           <a:lstStyle/>
           <a:p>
@@ -10925,7 +11159,7 @@
           <a:p>
             <a:r>
               <a:rPr lang="en-US" dirty="0"/>
-              <a:t>Clone your lab repo locally</a:t>
+              <a:t>Clone your lab repo to snappy1</a:t>
             </a:r>
           </a:p>
           <a:p>
@@ -10946,12 +11180,8 @@
           <a:p>
             <a:pPr lvl="1"/>
             <a:r>
-              <a:rPr lang="en-US" dirty="0" err="1"/>
-              <a:t>git</a:t>
-            </a:r>
-            <a:r>
-              <a:rPr lang="en-US" dirty="0"/>
-              <a:t> clone https://</a:t>
+              <a:rPr lang="en-US" dirty="0"/>
+              <a:t>git clone https://</a:t>
             </a:r>
             <a:r>
               <a:rPr lang="en-US" dirty="0" err="1"/>
@@ -10959,7 +11189,7 @@
             </a:r>
             <a:r>
               <a:rPr lang="en-US" dirty="0"/>
-              <a:t>/nyu-cso-fa20/clab-part1-&lt;</a:t>
+              <a:t>/nyu-cso-fa21/clab-part1-&lt;</a:t>
             </a:r>
             <a:r>
               <a:rPr lang="en-US" dirty="0" err="1"/>
@@ -10967,35 +11197,13 @@
             </a:r>
             <a:r>
               <a:rPr lang="en-US" dirty="0"/>
-              <a:t>&gt;.</a:t>
-            </a:r>
-            <a:r>
-              <a:rPr lang="en-US" dirty="0" err="1"/>
-              <a:t>git</a:t>
-            </a:r>
-            <a:r>
-              <a:rPr lang="en-US" dirty="0"/>
-              <a:t> lab1</a:t>
-            </a:r>
-          </a:p>
-          <a:p>
-            <a:r>
-              <a:rPr lang="en-US" dirty="0"/>
-              <a:t>Then make changes locally in the VM</a:t>
-            </a:r>
-          </a:p>
-          <a:p>
-            <a:r>
-              <a:rPr lang="en-US" dirty="0"/>
-              <a:t>Tell </a:t>
-            </a:r>
-            <a:r>
-              <a:rPr lang="en-US" dirty="0" err="1"/>
-              <a:t>git</a:t>
-            </a:r>
-            <a:r>
-              <a:rPr lang="en-US" dirty="0"/>
-              <a:t> to track changes</a:t>
+              <a:t>&gt;.git lab1</a:t>
+            </a:r>
+          </a:p>
+          <a:p>
+            <a:r>
+              <a:rPr lang="en-US" dirty="0"/>
+              <a:t>Tell git to track changes</a:t>
             </a:r>
           </a:p>
           <a:p>
@@ -11248,33 +11456,15 @@
                                   </p:childTnLst>
                                 </p:cTn>
                               </p:par>
-                            </p:childTnLst>
-                          </p:cTn>
-                        </p:par>
-                      </p:childTnLst>
-                    </p:cTn>
-                  </p:par>
-                  <p:par>
-                    <p:cTn id="15" fill="hold">
-                      <p:stCondLst>
-                        <p:cond delay="indefinite"/>
-                      </p:stCondLst>
-                      <p:childTnLst>
-                        <p:par>
-                          <p:cTn id="16" fill="hold">
-                            <p:stCondLst>
-                              <p:cond delay="0"/>
-                            </p:stCondLst>
-                            <p:childTnLst>
                               <p:par>
-                                <p:cTn id="17" presetID="1" presetClass="entr" presetSubtype="0" fill="hold" nodeType="clickEffect">
+                                <p:cTn id="15" presetID="1" presetClass="entr" presetSubtype="0" fill="hold" nodeType="withEffect">
                                   <p:stCondLst>
                                     <p:cond delay="0"/>
                                   </p:stCondLst>
                                   <p:childTnLst>
                                     <p:set>
                                       <p:cBhvr>
-                                        <p:cTn id="18" dur="1" fill="hold">
+                                        <p:cTn id="16" dur="1" fill="hold">
                                           <p:stCondLst>
                                             <p:cond delay="0"/>
                                           </p:stCondLst>
@@ -11297,8 +11487,26 @@
                                   </p:childTnLst>
                                 </p:cTn>
                               </p:par>
+                            </p:childTnLst>
+                          </p:cTn>
+                        </p:par>
+                      </p:childTnLst>
+                    </p:cTn>
+                  </p:par>
+                  <p:par>
+                    <p:cTn id="17" fill="hold">
+                      <p:stCondLst>
+                        <p:cond delay="indefinite"/>
+                      </p:stCondLst>
+                      <p:childTnLst>
+                        <p:par>
+                          <p:cTn id="18" fill="hold">
+                            <p:stCondLst>
+                              <p:cond delay="0"/>
+                            </p:stCondLst>
+                            <p:childTnLst>
                               <p:par>
-                                <p:cTn id="19" presetID="1" presetClass="entr" presetSubtype="0" fill="hold" nodeType="withEffect">
+                                <p:cTn id="19" presetID="1" presetClass="entr" presetSubtype="0" fill="hold" nodeType="clickEffect">
                                   <p:stCondLst>
                                     <p:cond delay="0"/>
                                   </p:stCondLst>
@@ -11328,33 +11536,15 @@
                                   </p:childTnLst>
                                 </p:cTn>
                               </p:par>
-                            </p:childTnLst>
-                          </p:cTn>
-                        </p:par>
-                      </p:childTnLst>
-                    </p:cTn>
-                  </p:par>
-                  <p:par>
-                    <p:cTn id="21" fill="hold">
-                      <p:stCondLst>
-                        <p:cond delay="indefinite"/>
-                      </p:stCondLst>
-                      <p:childTnLst>
-                        <p:par>
-                          <p:cTn id="22" fill="hold">
-                            <p:stCondLst>
-                              <p:cond delay="0"/>
-                            </p:stCondLst>
-                            <p:childTnLst>
                               <p:par>
-                                <p:cTn id="23" presetID="1" presetClass="entr" presetSubtype="0" fill="hold" nodeType="clickEffect">
+                                <p:cTn id="21" presetID="1" presetClass="entr" presetSubtype="0" fill="hold" nodeType="withEffect">
                                   <p:stCondLst>
                                     <p:cond delay="0"/>
                                   </p:stCondLst>
                                   <p:childTnLst>
                                     <p:set>
                                       <p:cBhvr>
-                                        <p:cTn id="24" dur="1" fill="hold">
+                                        <p:cTn id="22" dur="1" fill="hold">
                                           <p:stCondLst>
                                             <p:cond delay="0"/>
                                           </p:stCondLst>
@@ -11377,8 +11567,26 @@
                                   </p:childTnLst>
                                 </p:cTn>
                               </p:par>
+                            </p:childTnLst>
+                          </p:cTn>
+                        </p:par>
+                      </p:childTnLst>
+                    </p:cTn>
+                  </p:par>
+                  <p:par>
+                    <p:cTn id="23" fill="hold">
+                      <p:stCondLst>
+                        <p:cond delay="indefinite"/>
+                      </p:stCondLst>
+                      <p:childTnLst>
+                        <p:par>
+                          <p:cTn id="24" fill="hold">
+                            <p:stCondLst>
+                              <p:cond delay="0"/>
+                            </p:stCondLst>
+                            <p:childTnLst>
                               <p:par>
-                                <p:cTn id="25" presetID="1" presetClass="entr" presetSubtype="0" fill="hold" nodeType="withEffect">
+                                <p:cTn id="25" presetID="1" presetClass="entr" presetSubtype="0" fill="hold" nodeType="clickEffect">
                                   <p:stCondLst>
                                     <p:cond delay="0"/>
                                   </p:stCondLst>
@@ -11408,33 +11616,15 @@
                                   </p:childTnLst>
                                 </p:cTn>
                               </p:par>
-                            </p:childTnLst>
-                          </p:cTn>
-                        </p:par>
-                      </p:childTnLst>
-                    </p:cTn>
-                  </p:par>
-                  <p:par>
-                    <p:cTn id="27" fill="hold">
-                      <p:stCondLst>
-                        <p:cond delay="indefinite"/>
-                      </p:stCondLst>
-                      <p:childTnLst>
-                        <p:par>
-                          <p:cTn id="28" fill="hold">
-                            <p:stCondLst>
-                              <p:cond delay="0"/>
-                            </p:stCondLst>
-                            <p:childTnLst>
                               <p:par>
-                                <p:cTn id="29" presetID="1" presetClass="entr" presetSubtype="0" fill="hold" nodeType="clickEffect">
+                                <p:cTn id="27" presetID="1" presetClass="entr" presetSubtype="0" fill="hold" nodeType="withEffect">
                                   <p:stCondLst>
                                     <p:cond delay="0"/>
                                   </p:stCondLst>
                                   <p:childTnLst>
                                     <p:set>
                                       <p:cBhvr>
-                                        <p:cTn id="30" dur="1" fill="hold">
+                                        <p:cTn id="28" dur="1" fill="hold">
                                           <p:stCondLst>
                                             <p:cond delay="0"/>
                                           </p:stCondLst>
@@ -11443,37 +11633,6 @@
                                           <p:spTgt spid="3">
                                             <p:txEl>
                                               <p:pRg st="9" end="9"/>
-                                            </p:txEl>
-                                          </p:spTgt>
-                                        </p:tgtEl>
-                                        <p:attrNameLst>
-                                          <p:attrName>style.visibility</p:attrName>
-                                        </p:attrNameLst>
-                                      </p:cBhvr>
-                                      <p:to>
-                                        <p:strVal val="visible"/>
-                                      </p:to>
-                                    </p:set>
-                                  </p:childTnLst>
-                                </p:cTn>
-                              </p:par>
-                              <p:par>
-                                <p:cTn id="31" presetID="1" presetClass="entr" presetSubtype="0" fill="hold" nodeType="withEffect">
-                                  <p:stCondLst>
-                                    <p:cond delay="0"/>
-                                  </p:stCondLst>
-                                  <p:childTnLst>
-                                    <p:set>
-                                      <p:cBhvr>
-                                        <p:cTn id="32" dur="1" fill="hold">
-                                          <p:stCondLst>
-                                            <p:cond delay="0"/>
-                                          </p:stCondLst>
-                                        </p:cTn>
-                                        <p:tgtEl>
-                                          <p:spTgt spid="3">
-                                            <p:txEl>
-                                              <p:pRg st="10" end="10"/>
                                             </p:txEl>
                                           </p:spTgt>
                                         </p:tgtEl>
@@ -11614,7 +11773,7 @@
           <a:p>
             <a:r>
               <a:rPr lang="en-US" dirty="0"/>
-              <a:t>If you don’t use “-m” option, an command line editor will pop up for you to edit the commit message</a:t>
+              <a:t>If you don’t use “-m” option, a command line editor will pop up for you to edit the commit message</a:t>
             </a:r>
           </a:p>
           <a:p>
@@ -11810,7 +11969,7 @@
         </p:blipFill>
         <p:spPr>
           <a:xfrm>
-            <a:off x="2485390" y="2245360"/>
+            <a:off x="2485390" y="2260600"/>
             <a:ext cx="4749800" cy="2092569"/>
           </a:xfrm>
           <a:prstGeom prst="rect">
@@ -12609,23 +12768,7 @@
           <a:p>
             <a:r>
               <a:rPr lang="en-US" dirty="0"/>
-              <a:t>After setting lab repository, you ONLY need to use the </a:t>
-            </a:r>
-            <a:r>
-              <a:rPr lang="en-US" dirty="0" err="1"/>
-              <a:t>follwing</a:t>
-            </a:r>
-            <a:r>
-              <a:rPr lang="en-US" dirty="0"/>
-              <a:t> </a:t>
-            </a:r>
-            <a:r>
-              <a:rPr lang="en-US" dirty="0" err="1"/>
-              <a:t>git</a:t>
-            </a:r>
-            <a:r>
-              <a:rPr lang="en-US" dirty="0"/>
-              <a:t> commands:</a:t>
+              <a:t>After setting lab repository, you ONLY need to use the following git commands:</a:t>
             </a:r>
           </a:p>
           <a:p>
@@ -12818,7 +12961,7 @@
               <a:rPr lang="en-US" smtClean="0"/>
               <a:t>32</a:t>
             </a:fld>
-            <a:endParaRPr lang="en-US"/>
+            <a:endParaRPr lang="en-US" dirty="0"/>
           </a:p>
         </p:txBody>
       </p:sp>

</xml_diff>